<commit_message>
enable ssl support for data connection
</commit_message>
<xml_diff>
--- a/doc/shadow_port.pptx
+++ b/doc/shadow_port.pptx
@@ -293,7 +293,7 @@
             <a:fld id="{1D8BD707-D9CF-40AE-B4C6-C98DA3205C09}" type="datetimeFigureOut">
               <a:rPr lang="en-US" smtClean="0"/>
               <a:pPr/>
-              <a:t>1/25/2013</a:t>
+              <a:t>1/22/2013</a:t>
             </a:fld>
             <a:endParaRPr lang="en-US"/>
           </a:p>
@@ -460,7 +460,7 @@
             <a:fld id="{1D8BD707-D9CF-40AE-B4C6-C98DA3205C09}" type="datetimeFigureOut">
               <a:rPr lang="en-US" smtClean="0"/>
               <a:pPr/>
-              <a:t>1/25/2013</a:t>
+              <a:t>1/22/2013</a:t>
             </a:fld>
             <a:endParaRPr lang="en-US"/>
           </a:p>
@@ -637,7 +637,7 @@
             <a:fld id="{1D8BD707-D9CF-40AE-B4C6-C98DA3205C09}" type="datetimeFigureOut">
               <a:rPr lang="en-US" smtClean="0"/>
               <a:pPr/>
-              <a:t>1/25/2013</a:t>
+              <a:t>1/22/2013</a:t>
             </a:fld>
             <a:endParaRPr lang="en-US"/>
           </a:p>
@@ -804,7 +804,7 @@
             <a:fld id="{1D8BD707-D9CF-40AE-B4C6-C98DA3205C09}" type="datetimeFigureOut">
               <a:rPr lang="en-US" smtClean="0"/>
               <a:pPr/>
-              <a:t>1/25/2013</a:t>
+              <a:t>1/22/2013</a:t>
             </a:fld>
             <a:endParaRPr lang="en-US"/>
           </a:p>
@@ -1047,7 +1047,7 @@
             <a:fld id="{1D8BD707-D9CF-40AE-B4C6-C98DA3205C09}" type="datetimeFigureOut">
               <a:rPr lang="en-US" smtClean="0"/>
               <a:pPr/>
-              <a:t>1/25/2013</a:t>
+              <a:t>1/22/2013</a:t>
             </a:fld>
             <a:endParaRPr lang="en-US"/>
           </a:p>
@@ -1332,7 +1332,7 @@
             <a:fld id="{1D8BD707-D9CF-40AE-B4C6-C98DA3205C09}" type="datetimeFigureOut">
               <a:rPr lang="en-US" smtClean="0"/>
               <a:pPr/>
-              <a:t>1/25/2013</a:t>
+              <a:t>1/22/2013</a:t>
             </a:fld>
             <a:endParaRPr lang="en-US"/>
           </a:p>
@@ -1751,7 +1751,7 @@
             <a:fld id="{1D8BD707-D9CF-40AE-B4C6-C98DA3205C09}" type="datetimeFigureOut">
               <a:rPr lang="en-US" smtClean="0"/>
               <a:pPr/>
-              <a:t>1/25/2013</a:t>
+              <a:t>1/22/2013</a:t>
             </a:fld>
             <a:endParaRPr lang="en-US"/>
           </a:p>
@@ -1866,7 +1866,7 @@
             <a:fld id="{1D8BD707-D9CF-40AE-B4C6-C98DA3205C09}" type="datetimeFigureOut">
               <a:rPr lang="en-US" smtClean="0"/>
               <a:pPr/>
-              <a:t>1/25/2013</a:t>
+              <a:t>1/22/2013</a:t>
             </a:fld>
             <a:endParaRPr lang="en-US"/>
           </a:p>
@@ -1958,7 +1958,7 @@
             <a:fld id="{1D8BD707-D9CF-40AE-B4C6-C98DA3205C09}" type="datetimeFigureOut">
               <a:rPr lang="en-US" smtClean="0"/>
               <a:pPr/>
-              <a:t>1/25/2013</a:t>
+              <a:t>1/22/2013</a:t>
             </a:fld>
             <a:endParaRPr lang="en-US"/>
           </a:p>
@@ -2232,7 +2232,7 @@
             <a:fld id="{1D8BD707-D9CF-40AE-B4C6-C98DA3205C09}" type="datetimeFigureOut">
               <a:rPr lang="en-US" smtClean="0"/>
               <a:pPr/>
-              <a:t>1/25/2013</a:t>
+              <a:t>1/22/2013</a:t>
             </a:fld>
             <a:endParaRPr lang="en-US"/>
           </a:p>
@@ -2482,7 +2482,7 @@
             <a:fld id="{1D8BD707-D9CF-40AE-B4C6-C98DA3205C09}" type="datetimeFigureOut">
               <a:rPr lang="en-US" smtClean="0"/>
               <a:pPr/>
-              <a:t>1/25/2013</a:t>
+              <a:t>1/22/2013</a:t>
             </a:fld>
             <a:endParaRPr lang="en-US"/>
           </a:p>
@@ -2692,7 +2692,7 @@
             <a:fld id="{1D8BD707-D9CF-40AE-B4C6-C98DA3205C09}" type="datetimeFigureOut">
               <a:rPr lang="en-US" smtClean="0"/>
               <a:pPr/>
-              <a:t>1/25/2013</a:t>
+              <a:t>1/22/2013</a:t>
             </a:fld>
             <a:endParaRPr lang="en-US"/>
           </a:p>
@@ -3103,7 +3103,7 @@
           <a:lstStyle/>
           <a:p>
             <a:pPr algn="ctr"/>
-            <a:endParaRPr lang="en-US" dirty="0"/>
+            <a:endParaRPr lang="en-US"/>
           </a:p>
         </p:txBody>
       </p:sp>
@@ -3147,7 +3147,7 @@
           <a:lstStyle/>
           <a:p>
             <a:pPr algn="ctr"/>
-            <a:endParaRPr lang="en-US" dirty="0"/>
+            <a:endParaRPr lang="en-US"/>
           </a:p>
         </p:txBody>
       </p:sp>
@@ -3407,17 +3407,53 @@
       </p:sp>
       <p:cxnSp>
         <p:nvCxnSpPr>
+          <p:cNvPr id="14" name="Straight Arrow Connector 13"/>
+          <p:cNvCxnSpPr>
+            <a:stCxn id="11" idx="0"/>
+            <a:endCxn id="7" idx="2"/>
+          </p:cNvCxnSpPr>
+          <p:nvPr/>
+        </p:nvCxnSpPr>
+        <p:spPr>
+          <a:xfrm flipV="1">
+            <a:off x="1647092" y="3962400"/>
+            <a:ext cx="181708" cy="978877"/>
+          </a:xfrm>
+          <a:prstGeom prst="straightConnector1">
+            <a:avLst/>
+          </a:prstGeom>
+          <a:ln>
+            <a:tailEnd type="arrow"/>
+          </a:ln>
+        </p:spPr>
+        <p:style>
+          <a:lnRef idx="1">
+            <a:schemeClr val="accent1"/>
+          </a:lnRef>
+          <a:fillRef idx="0">
+            <a:schemeClr val="accent1"/>
+          </a:fillRef>
+          <a:effectRef idx="0">
+            <a:schemeClr val="accent1"/>
+          </a:effectRef>
+          <a:fontRef idx="minor">
+            <a:schemeClr val="tx1"/>
+          </a:fontRef>
+        </p:style>
+      </p:cxnSp>
+      <p:cxnSp>
+        <p:nvCxnSpPr>
           <p:cNvPr id="16" name="Straight Arrow Connector 15"/>
           <p:cNvCxnSpPr>
-            <a:stCxn id="8" idx="2"/>
-            <a:endCxn id="2" idx="1"/>
+            <a:stCxn id="12" idx="0"/>
+            <a:endCxn id="8" idx="2"/>
           </p:cNvCxnSpPr>
           <p:nvPr/>
         </p:nvCxnSpPr>
         <p:spPr>
-          <a:xfrm>
+          <a:xfrm flipH="1" flipV="1">
             <a:off x="7192108" y="3944815"/>
-            <a:ext cx="548729" cy="888699"/>
+            <a:ext cx="656492" cy="996462"/>
           </a:xfrm>
           <a:prstGeom prst="straightConnector1">
             <a:avLst/>
@@ -3630,180 +3666,6 @@
               <a:t>Overall</a:t>
             </a:r>
             <a:endParaRPr lang="en-US" sz="4000" dirty="0"/>
-          </a:p>
-        </p:txBody>
-      </p:sp>
-      <p:sp>
-        <p:nvSpPr>
-          <p:cNvPr id="2" name="Flowchart: Connector 1"/>
-          <p:cNvSpPr/>
-          <p:nvPr/>
-        </p:nvSpPr>
-        <p:spPr>
-          <a:xfrm>
-            <a:off x="7696200" y="4788877"/>
-            <a:ext cx="304800" cy="304800"/>
-          </a:xfrm>
-          <a:prstGeom prst="flowChartConnector">
-            <a:avLst/>
-          </a:prstGeom>
-        </p:spPr>
-        <p:style>
-          <a:lnRef idx="2">
-            <a:schemeClr val="accent1">
-              <a:shade val="50000"/>
-            </a:schemeClr>
-          </a:lnRef>
-          <a:fillRef idx="1">
-            <a:schemeClr val="accent1"/>
-          </a:fillRef>
-          <a:effectRef idx="0">
-            <a:schemeClr val="accent1"/>
-          </a:effectRef>
-          <a:fontRef idx="minor">
-            <a:schemeClr val="lt1"/>
-          </a:fontRef>
-        </p:style>
-        <p:txBody>
-          <a:bodyPr rtlCol="0" anchor="ctr"/>
-          <a:lstStyle/>
-          <a:p>
-            <a:pPr algn="ctr"/>
-            <a:endParaRPr lang="en-US"/>
-          </a:p>
-        </p:txBody>
-      </p:sp>
-      <p:sp>
-        <p:nvSpPr>
-          <p:cNvPr id="28" name="Flowchart: Connector 27"/>
-          <p:cNvSpPr/>
-          <p:nvPr/>
-        </p:nvSpPr>
-        <p:spPr>
-          <a:xfrm>
-            <a:off x="1705708" y="3810000"/>
-            <a:ext cx="304800" cy="304800"/>
-          </a:xfrm>
-          <a:prstGeom prst="flowChartConnector">
-            <a:avLst/>
-          </a:prstGeom>
-        </p:spPr>
-        <p:style>
-          <a:lnRef idx="2">
-            <a:schemeClr val="accent1"/>
-          </a:lnRef>
-          <a:fillRef idx="1">
-            <a:schemeClr val="lt1"/>
-          </a:fillRef>
-          <a:effectRef idx="0">
-            <a:schemeClr val="accent1"/>
-          </a:effectRef>
-          <a:fontRef idx="minor">
-            <a:schemeClr val="dk1"/>
-          </a:fontRef>
-        </p:style>
-        <p:txBody>
-          <a:bodyPr rtlCol="0" anchor="ctr"/>
-          <a:lstStyle/>
-          <a:p>
-            <a:pPr algn="ctr"/>
-            <a:endParaRPr lang="en-US"/>
-          </a:p>
-        </p:txBody>
-      </p:sp>
-      <p:cxnSp>
-        <p:nvCxnSpPr>
-          <p:cNvPr id="14" name="Straight Arrow Connector 13"/>
-          <p:cNvCxnSpPr>
-            <a:stCxn id="11" idx="0"/>
-            <a:endCxn id="7" idx="2"/>
-          </p:cNvCxnSpPr>
-          <p:nvPr/>
-        </p:nvCxnSpPr>
-        <p:spPr>
-          <a:xfrm flipV="1">
-            <a:off x="1647092" y="3962400"/>
-            <a:ext cx="181708" cy="978877"/>
-          </a:xfrm>
-          <a:prstGeom prst="straightConnector1">
-            <a:avLst/>
-          </a:prstGeom>
-          <a:ln>
-            <a:tailEnd type="arrow"/>
-          </a:ln>
-        </p:spPr>
-        <p:style>
-          <a:lnRef idx="1">
-            <a:schemeClr val="accent1"/>
-          </a:lnRef>
-          <a:fillRef idx="0">
-            <a:schemeClr val="accent1"/>
-          </a:fillRef>
-          <a:effectRef idx="0">
-            <a:schemeClr val="accent1"/>
-          </a:effectRef>
-          <a:fontRef idx="minor">
-            <a:schemeClr val="tx1"/>
-          </a:fontRef>
-        </p:style>
-      </p:cxnSp>
-      <p:sp>
-        <p:nvSpPr>
-          <p:cNvPr id="13" name="TextBox 12"/>
-          <p:cNvSpPr txBox="1"/>
-          <p:nvPr/>
-        </p:nvSpPr>
-        <p:spPr>
-          <a:xfrm>
-            <a:off x="1905000" y="3974068"/>
-            <a:ext cx="1384418" cy="369332"/>
-          </a:xfrm>
-          <a:prstGeom prst="rect">
-            <a:avLst/>
-          </a:prstGeom>
-          <a:noFill/>
-        </p:spPr>
-        <p:txBody>
-          <a:bodyPr wrap="none" rtlCol="0">
-            <a:spAutoFit/>
-          </a:bodyPr>
-          <a:lstStyle/>
-          <a:p>
-            <a:r>
-              <a:rPr lang="en-US" dirty="0" smtClean="0"/>
-              <a:t>Shadow port</a:t>
-            </a:r>
-            <a:endParaRPr lang="en-US" dirty="0"/>
-          </a:p>
-        </p:txBody>
-      </p:sp>
-      <p:sp>
-        <p:nvSpPr>
-          <p:cNvPr id="15" name="TextBox 14"/>
-          <p:cNvSpPr txBox="1"/>
-          <p:nvPr/>
-        </p:nvSpPr>
-        <p:spPr>
-          <a:xfrm>
-            <a:off x="6657967" y="4648200"/>
-            <a:ext cx="1038233" cy="369332"/>
-          </a:xfrm>
-          <a:prstGeom prst="rect">
-            <a:avLst/>
-          </a:prstGeom>
-          <a:noFill/>
-        </p:spPr>
-        <p:txBody>
-          <a:bodyPr wrap="none" rtlCol="0">
-            <a:spAutoFit/>
-          </a:bodyPr>
-          <a:lstStyle/>
-          <a:p>
-            <a:r>
-              <a:rPr lang="en-US" dirty="0" smtClean="0"/>
-              <a:t>Real port</a:t>
-            </a:r>
-            <a:endParaRPr lang="en-US" dirty="0"/>
           </a:p>
         </p:txBody>
       </p:sp>
@@ -4520,35 +4382,6 @@
             <a:r>
               <a:rPr lang="en-US" dirty="0"/>
               <a:t> </a:t>
-            </a:r>
-          </a:p>
-        </p:txBody>
-      </p:sp>
-      <p:sp>
-        <p:nvSpPr>
-          <p:cNvPr id="2" name="TextBox 1"/>
-          <p:cNvSpPr txBox="1"/>
-          <p:nvPr/>
-        </p:nvSpPr>
-        <p:spPr>
-          <a:xfrm>
-            <a:off x="1219200" y="4273034"/>
-            <a:ext cx="603050" cy="369332"/>
-          </a:xfrm>
-          <a:prstGeom prst="rect">
-            <a:avLst/>
-          </a:prstGeom>
-          <a:noFill/>
-        </p:spPr>
-        <p:txBody>
-          <a:bodyPr wrap="none" rtlCol="0">
-            <a:spAutoFit/>
-          </a:bodyPr>
-          <a:lstStyle/>
-          <a:p>
-            <a:r>
-              <a:rPr lang="en-US" dirty="0" smtClean="0"/>
-              <a:t>loop</a:t>
             </a:r>
             <a:endParaRPr lang="en-US" dirty="0"/>
           </a:p>

</xml_diff>